<commit_message>
file paths, pieplts to graphs
</commit_message>
<xml_diff>
--- a/reports/SUICnotes.pptx
+++ b/reports/SUICnotes.pptx
@@ -191,7 +191,7 @@
           <a:noFill/>
           <a:extLst>
             <a:ext uri="{909E8E84-426E-40dd-AFC4-6F175D3DCCD1}">
-              <a14:hiddenFill xmlns:a14="http://schemas.microsoft.com/office/drawing/2010/main" xmlns="">
+              <a14:hiddenFill xmlns="" xmlns:a14="http://schemas.microsoft.com/office/drawing/2010/main">
                 <a:solidFill>
                   <a:srgbClr val="FFFFFF"/>
                 </a:solidFill>
@@ -251,7 +251,7 @@
             </a:ln>
             <a:extLst>
               <a:ext uri="{91240B29-F687-4f45-9708-019B960494DF}">
-                <a14:hiddenLine xmlns:a14="http://schemas.microsoft.com/office/drawing/2010/main" xmlns="" w="9525">
+                <a14:hiddenLine xmlns="" xmlns:a14="http://schemas.microsoft.com/office/drawing/2010/main" w="9525">
                   <a:solidFill>
                     <a:srgbClr val="000000"/>
                   </a:solidFill>
@@ -341,7 +341,7 @@
             </a:ln>
             <a:extLst>
               <a:ext uri="{91240B29-F687-4f45-9708-019B960494DF}">
-                <a14:hiddenLine xmlns:a14="http://schemas.microsoft.com/office/drawing/2010/main" xmlns="" w="9525">
+                <a14:hiddenLine xmlns="" xmlns:a14="http://schemas.microsoft.com/office/drawing/2010/main" w="9525">
                   <a:solidFill>
                     <a:srgbClr val="000000"/>
                   </a:solidFill>
@@ -431,7 +431,7 @@
             </a:ln>
             <a:extLst>
               <a:ext uri="{91240B29-F687-4f45-9708-019B960494DF}">
-                <a14:hiddenLine xmlns:a14="http://schemas.microsoft.com/office/drawing/2010/main" xmlns="" w="9525">
+                <a14:hiddenLine xmlns="" xmlns:a14="http://schemas.microsoft.com/office/drawing/2010/main" w="9525">
                   <a:solidFill>
                     <a:srgbClr val="000000"/>
                   </a:solidFill>
@@ -465,7 +465,7 @@
             </a:ln>
             <a:extLst>
               <a:ext uri="{91240B29-F687-4f45-9708-019B960494DF}">
-                <a14:hiddenLine xmlns:a14="http://schemas.microsoft.com/office/drawing/2010/main" xmlns="" w="9525">
+                <a14:hiddenLine xmlns="" xmlns:a14="http://schemas.microsoft.com/office/drawing/2010/main" w="9525">
                   <a:solidFill>
                     <a:srgbClr val="000000"/>
                   </a:solidFill>
@@ -555,7 +555,7 @@
             </a:ln>
             <a:extLst>
               <a:ext uri="{91240B29-F687-4f45-9708-019B960494DF}">
-                <a14:hiddenLine xmlns:a14="http://schemas.microsoft.com/office/drawing/2010/main" xmlns="" w="9525">
+                <a14:hiddenLine xmlns="" xmlns:a14="http://schemas.microsoft.com/office/drawing/2010/main" w="9525">
                   <a:solidFill>
                     <a:srgbClr val="000000"/>
                   </a:solidFill>
@@ -617,7 +617,7 @@
             </a:ln>
             <a:extLst>
               <a:ext uri="{91240B29-F687-4f45-9708-019B960494DF}">
-                <a14:hiddenLine xmlns:a14="http://schemas.microsoft.com/office/drawing/2010/main" xmlns="" w="9525">
+                <a14:hiddenLine xmlns="" xmlns:a14="http://schemas.microsoft.com/office/drawing/2010/main" w="9525">
                   <a:solidFill>
                     <a:srgbClr val="000000"/>
                   </a:solidFill>
@@ -679,7 +679,7 @@
             </a:ln>
             <a:extLst>
               <a:ext uri="{91240B29-F687-4f45-9708-019B960494DF}">
-                <a14:hiddenLine xmlns:a14="http://schemas.microsoft.com/office/drawing/2010/main" xmlns="" w="9525">
+                <a14:hiddenLine xmlns="" xmlns:a14="http://schemas.microsoft.com/office/drawing/2010/main" w="9525">
                   <a:solidFill>
                     <a:srgbClr val="000000"/>
                   </a:solidFill>
@@ -769,7 +769,7 @@
             </a:ln>
             <a:extLst>
               <a:ext uri="{91240B29-F687-4f45-9708-019B960494DF}">
-                <a14:hiddenLine xmlns:a14="http://schemas.microsoft.com/office/drawing/2010/main" xmlns="" w="9525">
+                <a14:hiddenLine xmlns="" xmlns:a14="http://schemas.microsoft.com/office/drawing/2010/main" w="9525">
                   <a:solidFill>
                     <a:srgbClr val="000000"/>
                   </a:solidFill>
@@ -831,7 +831,7 @@
             </a:ln>
             <a:extLst>
               <a:ext uri="{91240B29-F687-4f45-9708-019B960494DF}">
-                <a14:hiddenLine xmlns:a14="http://schemas.microsoft.com/office/drawing/2010/main" xmlns="" w="9525">
+                <a14:hiddenLine xmlns="" xmlns:a14="http://schemas.microsoft.com/office/drawing/2010/main" w="9525">
                   <a:solidFill>
                     <a:srgbClr val="000000"/>
                   </a:solidFill>
@@ -893,7 +893,7 @@
             </a:ln>
             <a:extLst>
               <a:ext uri="{91240B29-F687-4f45-9708-019B960494DF}">
-                <a14:hiddenLine xmlns:a14="http://schemas.microsoft.com/office/drawing/2010/main" xmlns="" w="9525">
+                <a14:hiddenLine xmlns="" xmlns:a14="http://schemas.microsoft.com/office/drawing/2010/main" w="9525">
                   <a:solidFill>
                     <a:srgbClr val="000000"/>
                   </a:solidFill>
@@ -983,7 +983,7 @@
             </a:ln>
             <a:extLst>
               <a:ext uri="{91240B29-F687-4f45-9708-019B960494DF}">
-                <a14:hiddenLine xmlns:a14="http://schemas.microsoft.com/office/drawing/2010/main" xmlns="" w="9525">
+                <a14:hiddenLine xmlns="" xmlns:a14="http://schemas.microsoft.com/office/drawing/2010/main" w="9525">
                   <a:solidFill>
                     <a:srgbClr val="000000"/>
                   </a:solidFill>
@@ -1073,7 +1073,7 @@
             </a:ln>
             <a:extLst>
               <a:ext uri="{91240B29-F687-4f45-9708-019B960494DF}">
-                <a14:hiddenLine xmlns:a14="http://schemas.microsoft.com/office/drawing/2010/main" xmlns="" w="9525">
+                <a14:hiddenLine xmlns="" xmlns:a14="http://schemas.microsoft.com/office/drawing/2010/main" w="9525">
                   <a:solidFill>
                     <a:srgbClr val="000000"/>
                   </a:solidFill>
@@ -1135,7 +1135,7 @@
             </a:ln>
             <a:extLst>
               <a:ext uri="{91240B29-F687-4f45-9708-019B960494DF}">
-                <a14:hiddenLine xmlns:a14="http://schemas.microsoft.com/office/drawing/2010/main" xmlns="" w="9525">
+                <a14:hiddenLine xmlns="" xmlns:a14="http://schemas.microsoft.com/office/drawing/2010/main" w="9525">
                   <a:solidFill>
                     <a:srgbClr val="000000"/>
                   </a:solidFill>
@@ -1245,7 +1245,7 @@
             </a:ln>
             <a:extLst>
               <a:ext uri="{91240B29-F687-4f45-9708-019B960494DF}">
-                <a14:hiddenLine xmlns:a14="http://schemas.microsoft.com/office/drawing/2010/main" xmlns="" w="9525">
+                <a14:hiddenLine xmlns="" xmlns:a14="http://schemas.microsoft.com/office/drawing/2010/main" w="9525">
                   <a:solidFill>
                     <a:srgbClr val="000000"/>
                   </a:solidFill>
@@ -1307,7 +1307,7 @@
             </a:ln>
             <a:extLst>
               <a:ext uri="{91240B29-F687-4f45-9708-019B960494DF}">
-                <a14:hiddenLine xmlns:a14="http://schemas.microsoft.com/office/drawing/2010/main" xmlns="" w="9525">
+                <a14:hiddenLine xmlns="" xmlns:a14="http://schemas.microsoft.com/office/drawing/2010/main" w="9525">
                   <a:solidFill>
                     <a:srgbClr val="000000"/>
                   </a:solidFill>
@@ -1397,7 +1397,7 @@
             </a:ln>
             <a:extLst>
               <a:ext uri="{91240B29-F687-4f45-9708-019B960494DF}">
-                <a14:hiddenLine xmlns:a14="http://schemas.microsoft.com/office/drawing/2010/main" xmlns="" w="9525">
+                <a14:hiddenLine xmlns="" xmlns:a14="http://schemas.microsoft.com/office/drawing/2010/main" w="9525">
                   <a:solidFill>
                     <a:srgbClr val="000000"/>
                   </a:solidFill>
@@ -1487,7 +1487,7 @@
             </a:ln>
             <a:extLst>
               <a:ext uri="{91240B29-F687-4f45-9708-019B960494DF}">
-                <a14:hiddenLine xmlns:a14="http://schemas.microsoft.com/office/drawing/2010/main" xmlns="" w="9525">
+                <a14:hiddenLine xmlns="" xmlns:a14="http://schemas.microsoft.com/office/drawing/2010/main" w="9525">
                   <a:solidFill>
                     <a:srgbClr val="000000"/>
                   </a:solidFill>
@@ -1549,7 +1549,7 @@
             </a:ln>
             <a:extLst>
               <a:ext uri="{91240B29-F687-4f45-9708-019B960494DF}">
-                <a14:hiddenLine xmlns:a14="http://schemas.microsoft.com/office/drawing/2010/main" xmlns="" w="9525">
+                <a14:hiddenLine xmlns="" xmlns:a14="http://schemas.microsoft.com/office/drawing/2010/main" w="9525">
                   <a:solidFill>
                     <a:srgbClr val="000000"/>
                   </a:solidFill>
@@ -1639,7 +1639,7 @@
             </a:ln>
             <a:extLst>
               <a:ext uri="{91240B29-F687-4f45-9708-019B960494DF}">
-                <a14:hiddenLine xmlns:a14="http://schemas.microsoft.com/office/drawing/2010/main" xmlns="" w="9525">
+                <a14:hiddenLine xmlns="" xmlns:a14="http://schemas.microsoft.com/office/drawing/2010/main" w="9525">
                   <a:solidFill>
                     <a:srgbClr val="000000"/>
                   </a:solidFill>
@@ -1729,7 +1729,7 @@
             </a:ln>
             <a:extLst>
               <a:ext uri="{91240B29-F687-4f45-9708-019B960494DF}">
-                <a14:hiddenLine xmlns:a14="http://schemas.microsoft.com/office/drawing/2010/main" xmlns="" w="9525">
+                <a14:hiddenLine xmlns="" xmlns:a14="http://schemas.microsoft.com/office/drawing/2010/main" w="9525">
                   <a:solidFill>
                     <a:srgbClr val="000000"/>
                   </a:solidFill>
@@ -1785,7 +1785,7 @@
             </a:ln>
             <a:extLst>
               <a:ext uri="{91240B29-F687-4f45-9708-019B960494DF}">
-                <a14:hiddenLine xmlns:a14="http://schemas.microsoft.com/office/drawing/2010/main" xmlns="" w="9525">
+                <a14:hiddenLine xmlns="" xmlns:a14="http://schemas.microsoft.com/office/drawing/2010/main" w="9525">
                   <a:solidFill>
                     <a:srgbClr val="000000"/>
                   </a:solidFill>
@@ -1875,7 +1875,7 @@
             </a:ln>
             <a:extLst>
               <a:ext uri="{91240B29-F687-4f45-9708-019B960494DF}">
-                <a14:hiddenLine xmlns:a14="http://schemas.microsoft.com/office/drawing/2010/main" xmlns="" w="9525">
+                <a14:hiddenLine xmlns="" xmlns:a14="http://schemas.microsoft.com/office/drawing/2010/main" w="9525">
                   <a:solidFill>
                     <a:srgbClr val="000000"/>
                   </a:solidFill>
@@ -1931,7 +1931,7 @@
             </a:ln>
             <a:extLst>
               <a:ext uri="{91240B29-F687-4f45-9708-019B960494DF}">
-                <a14:hiddenLine xmlns:a14="http://schemas.microsoft.com/office/drawing/2010/main" xmlns="" w="9525">
+                <a14:hiddenLine xmlns="" xmlns:a14="http://schemas.microsoft.com/office/drawing/2010/main" w="9525">
                   <a:solidFill>
                     <a:srgbClr val="000000"/>
                   </a:solidFill>
@@ -2021,7 +2021,7 @@
             </a:ln>
             <a:extLst>
               <a:ext uri="{91240B29-F687-4f45-9708-019B960494DF}">
-                <a14:hiddenLine xmlns:a14="http://schemas.microsoft.com/office/drawing/2010/main" xmlns="" w="9525">
+                <a14:hiddenLine xmlns="" xmlns:a14="http://schemas.microsoft.com/office/drawing/2010/main" w="9525">
                   <a:solidFill>
                     <a:srgbClr val="000000"/>
                   </a:solidFill>
@@ -2089,7 +2089,7 @@
             </a:ln>
             <a:extLst>
               <a:ext uri="{91240B29-F687-4f45-9708-019B960494DF}">
-                <a14:hiddenLine xmlns:a14="http://schemas.microsoft.com/office/drawing/2010/main" xmlns="" w="9525">
+                <a14:hiddenLine xmlns="" xmlns:a14="http://schemas.microsoft.com/office/drawing/2010/main" w="9525">
                   <a:solidFill>
                     <a:srgbClr val="000000"/>
                   </a:solidFill>
@@ -2179,7 +2179,7 @@
             </a:ln>
             <a:extLst>
               <a:ext uri="{91240B29-F687-4f45-9708-019B960494DF}">
-                <a14:hiddenLine xmlns:a14="http://schemas.microsoft.com/office/drawing/2010/main" xmlns="" w="9525">
+                <a14:hiddenLine xmlns="" xmlns:a14="http://schemas.microsoft.com/office/drawing/2010/main" w="9525">
                   <a:solidFill>
                     <a:srgbClr val="000000"/>
                   </a:solidFill>
@@ -2247,7 +2247,7 @@
             </a:ln>
             <a:extLst>
               <a:ext uri="{91240B29-F687-4f45-9708-019B960494DF}">
-                <a14:hiddenLine xmlns:a14="http://schemas.microsoft.com/office/drawing/2010/main" xmlns="" w="9525">
+                <a14:hiddenLine xmlns="" xmlns:a14="http://schemas.microsoft.com/office/drawing/2010/main" w="9525">
                   <a:solidFill>
                     <a:srgbClr val="000000"/>
                   </a:solidFill>
@@ -2337,7 +2337,7 @@
             </a:ln>
             <a:extLst>
               <a:ext uri="{91240B29-F687-4f45-9708-019B960494DF}">
-                <a14:hiddenLine xmlns:a14="http://schemas.microsoft.com/office/drawing/2010/main" xmlns="" w="9525">
+                <a14:hiddenLine xmlns="" xmlns:a14="http://schemas.microsoft.com/office/drawing/2010/main" w="9525">
                   <a:solidFill>
                     <a:srgbClr val="000000"/>
                   </a:solidFill>
@@ -2371,7 +2371,7 @@
             </a:ln>
             <a:extLst>
               <a:ext uri="{91240B29-F687-4f45-9708-019B960494DF}">
-                <a14:hiddenLine xmlns:a14="http://schemas.microsoft.com/office/drawing/2010/main" xmlns="" w="9525">
+                <a14:hiddenLine xmlns="" xmlns:a14="http://schemas.microsoft.com/office/drawing/2010/main" w="9525">
                   <a:solidFill>
                     <a:srgbClr val="000000"/>
                   </a:solidFill>
@@ -2461,7 +2461,7 @@
             </a:ln>
             <a:extLst>
               <a:ext uri="{91240B29-F687-4f45-9708-019B960494DF}">
-                <a14:hiddenLine xmlns:a14="http://schemas.microsoft.com/office/drawing/2010/main" xmlns="" w="9525">
+                <a14:hiddenLine xmlns="" xmlns:a14="http://schemas.microsoft.com/office/drawing/2010/main" w="9525">
                   <a:solidFill>
                     <a:srgbClr val="000000"/>
                   </a:solidFill>
@@ -2523,7 +2523,7 @@
             </a:ln>
             <a:extLst>
               <a:ext uri="{91240B29-F687-4f45-9708-019B960494DF}">
-                <a14:hiddenLine xmlns:a14="http://schemas.microsoft.com/office/drawing/2010/main" xmlns="" w="9525">
+                <a14:hiddenLine xmlns="" xmlns:a14="http://schemas.microsoft.com/office/drawing/2010/main" w="9525">
                   <a:solidFill>
                     <a:srgbClr val="000000"/>
                   </a:solidFill>
@@ -2585,7 +2585,7 @@
             </a:ln>
             <a:extLst>
               <a:ext uri="{91240B29-F687-4f45-9708-019B960494DF}">
-                <a14:hiddenLine xmlns:a14="http://schemas.microsoft.com/office/drawing/2010/main" xmlns="" w="9525">
+                <a14:hiddenLine xmlns="" xmlns:a14="http://schemas.microsoft.com/office/drawing/2010/main" w="9525">
                   <a:solidFill>
                     <a:srgbClr val="000000"/>
                   </a:solidFill>
@@ -2675,7 +2675,7 @@
             </a:ln>
             <a:extLst>
               <a:ext uri="{91240B29-F687-4f45-9708-019B960494DF}">
-                <a14:hiddenLine xmlns:a14="http://schemas.microsoft.com/office/drawing/2010/main" xmlns="" w="9525">
+                <a14:hiddenLine xmlns="" xmlns:a14="http://schemas.microsoft.com/office/drawing/2010/main" w="9525">
                   <a:solidFill>
                     <a:srgbClr val="000000"/>
                   </a:solidFill>
@@ -2743,7 +2743,7 @@
             </a:ln>
             <a:extLst>
               <a:ext uri="{91240B29-F687-4f45-9708-019B960494DF}">
-                <a14:hiddenLine xmlns:a14="http://schemas.microsoft.com/office/drawing/2010/main" xmlns="" w="9525">
+                <a14:hiddenLine xmlns="" xmlns:a14="http://schemas.microsoft.com/office/drawing/2010/main" w="9525">
                   <a:solidFill>
                     <a:srgbClr val="000000"/>
                   </a:solidFill>
@@ -2805,7 +2805,7 @@
             </a:ln>
             <a:extLst>
               <a:ext uri="{91240B29-F687-4f45-9708-019B960494DF}">
-                <a14:hiddenLine xmlns:a14="http://schemas.microsoft.com/office/drawing/2010/main" xmlns="" w="9525">
+                <a14:hiddenLine xmlns="" xmlns:a14="http://schemas.microsoft.com/office/drawing/2010/main" w="9525">
                   <a:solidFill>
                     <a:srgbClr val="000000"/>
                   </a:solidFill>
@@ -2895,7 +2895,7 @@
             </a:ln>
             <a:extLst>
               <a:ext uri="{91240B29-F687-4f45-9708-019B960494DF}">
-                <a14:hiddenLine xmlns:a14="http://schemas.microsoft.com/office/drawing/2010/main" xmlns="" w="9525">
+                <a14:hiddenLine xmlns="" xmlns:a14="http://schemas.microsoft.com/office/drawing/2010/main" w="9525">
                   <a:solidFill>
                     <a:srgbClr val="000000"/>
                   </a:solidFill>
@@ -2957,7 +2957,7 @@
             </a:ln>
             <a:extLst>
               <a:ext uri="{91240B29-F687-4f45-9708-019B960494DF}">
-                <a14:hiddenLine xmlns:a14="http://schemas.microsoft.com/office/drawing/2010/main" xmlns="" w="9525">
+                <a14:hiddenLine xmlns="" xmlns:a14="http://schemas.microsoft.com/office/drawing/2010/main" w="9525">
                   <a:solidFill>
                     <a:srgbClr val="000000"/>
                   </a:solidFill>
@@ -3047,7 +3047,7 @@
             </a:ln>
             <a:extLst>
               <a:ext uri="{91240B29-F687-4f45-9708-019B960494DF}">
-                <a14:hiddenLine xmlns:a14="http://schemas.microsoft.com/office/drawing/2010/main" xmlns="" w="9525">
+                <a14:hiddenLine xmlns="" xmlns:a14="http://schemas.microsoft.com/office/drawing/2010/main" w="9525">
                   <a:solidFill>
                     <a:srgbClr val="000000"/>
                   </a:solidFill>
@@ -3109,7 +3109,7 @@
             </a:ln>
             <a:extLst>
               <a:ext uri="{91240B29-F687-4f45-9708-019B960494DF}">
-                <a14:hiddenLine xmlns:a14="http://schemas.microsoft.com/office/drawing/2010/main" xmlns="" w="9525">
+                <a14:hiddenLine xmlns="" xmlns:a14="http://schemas.microsoft.com/office/drawing/2010/main" w="9525">
                   <a:solidFill>
                     <a:srgbClr val="000000"/>
                   </a:solidFill>
@@ -3199,7 +3199,7 @@
             </a:ln>
             <a:extLst>
               <a:ext uri="{91240B29-F687-4f45-9708-019B960494DF}">
-                <a14:hiddenLine xmlns:a14="http://schemas.microsoft.com/office/drawing/2010/main" xmlns="" w="9525">
+                <a14:hiddenLine xmlns="" xmlns:a14="http://schemas.microsoft.com/office/drawing/2010/main" w="9525">
                   <a:solidFill>
                     <a:srgbClr val="000000"/>
                   </a:solidFill>
@@ -3233,7 +3233,7 @@
             </a:ln>
             <a:extLst>
               <a:ext uri="{91240B29-F687-4f45-9708-019B960494DF}">
-                <a14:hiddenLine xmlns:a14="http://schemas.microsoft.com/office/drawing/2010/main" xmlns="" w="9525">
+                <a14:hiddenLine xmlns="" xmlns:a14="http://schemas.microsoft.com/office/drawing/2010/main" w="9525">
                   <a:solidFill>
                     <a:srgbClr val="000000"/>
                   </a:solidFill>
@@ -3298,7 +3298,7 @@
             </a:ln>
             <a:extLst>
               <a:ext uri="{91240B29-F687-4f45-9708-019B960494DF}">
-                <a14:hiddenLine xmlns:a14="http://schemas.microsoft.com/office/drawing/2010/main" xmlns="" w="9525">
+                <a14:hiddenLine xmlns="" xmlns:a14="http://schemas.microsoft.com/office/drawing/2010/main" w="9525">
                   <a:solidFill>
                     <a:srgbClr val="000000"/>
                   </a:solidFill>
@@ -3388,7 +3388,7 @@
             </a:ln>
             <a:extLst>
               <a:ext uri="{91240B29-F687-4f45-9708-019B960494DF}">
-                <a14:hiddenLine xmlns:a14="http://schemas.microsoft.com/office/drawing/2010/main" xmlns="" w="9525">
+                <a14:hiddenLine xmlns="" xmlns:a14="http://schemas.microsoft.com/office/drawing/2010/main" w="9525">
                   <a:solidFill>
                     <a:srgbClr val="000000"/>
                   </a:solidFill>
@@ -3450,7 +3450,7 @@
             </a:ln>
             <a:extLst>
               <a:ext uri="{91240B29-F687-4f45-9708-019B960494DF}">
-                <a14:hiddenLine xmlns:a14="http://schemas.microsoft.com/office/drawing/2010/main" xmlns="" w="9525">
+                <a14:hiddenLine xmlns="" xmlns:a14="http://schemas.microsoft.com/office/drawing/2010/main" w="9525">
                   <a:solidFill>
                     <a:srgbClr val="000000"/>
                   </a:solidFill>
@@ -3540,7 +3540,7 @@
             </a:ln>
             <a:extLst>
               <a:ext uri="{91240B29-F687-4f45-9708-019B960494DF}">
-                <a14:hiddenLine xmlns:a14="http://schemas.microsoft.com/office/drawing/2010/main" xmlns="" w="9525">
+                <a14:hiddenLine xmlns="" xmlns:a14="http://schemas.microsoft.com/office/drawing/2010/main" w="9525">
                   <a:solidFill>
                     <a:srgbClr val="000000"/>
                   </a:solidFill>
@@ -3630,7 +3630,7 @@
             </a:ln>
             <a:extLst>
               <a:ext uri="{91240B29-F687-4f45-9708-019B960494DF}">
-                <a14:hiddenLine xmlns:a14="http://schemas.microsoft.com/office/drawing/2010/main" xmlns="" w="9525">
+                <a14:hiddenLine xmlns="" xmlns:a14="http://schemas.microsoft.com/office/drawing/2010/main" w="9525">
                   <a:solidFill>
                     <a:srgbClr val="000000"/>
                   </a:solidFill>
@@ -3695,7 +3695,7 @@
             </a:ln>
             <a:extLst>
               <a:ext uri="{91240B29-F687-4f45-9708-019B960494DF}">
-                <a14:hiddenLine xmlns:a14="http://schemas.microsoft.com/office/drawing/2010/main" xmlns="" w="9525">
+                <a14:hiddenLine xmlns="" xmlns:a14="http://schemas.microsoft.com/office/drawing/2010/main" w="9525">
                   <a:solidFill>
                     <a:srgbClr val="000000"/>
                   </a:solidFill>
@@ -3757,7 +3757,7 @@
             </a:ln>
             <a:extLst>
               <a:ext uri="{91240B29-F687-4f45-9708-019B960494DF}">
-                <a14:hiddenLine xmlns:a14="http://schemas.microsoft.com/office/drawing/2010/main" xmlns="" w="9525">
+                <a14:hiddenLine xmlns="" xmlns:a14="http://schemas.microsoft.com/office/drawing/2010/main" w="9525">
                   <a:solidFill>
                     <a:srgbClr val="000000"/>
                   </a:solidFill>
@@ -3847,7 +3847,7 @@
             </a:ln>
             <a:extLst>
               <a:ext uri="{91240B29-F687-4f45-9708-019B960494DF}">
-                <a14:hiddenLine xmlns:a14="http://schemas.microsoft.com/office/drawing/2010/main" xmlns="" w="9525">
+                <a14:hiddenLine xmlns="" xmlns:a14="http://schemas.microsoft.com/office/drawing/2010/main" w="9525">
                   <a:solidFill>
                     <a:srgbClr val="000000"/>
                   </a:solidFill>
@@ -3937,7 +3937,7 @@
             </a:ln>
             <a:extLst>
               <a:ext uri="{91240B29-F687-4f45-9708-019B960494DF}">
-                <a14:hiddenLine xmlns:a14="http://schemas.microsoft.com/office/drawing/2010/main" xmlns="" w="9525">
+                <a14:hiddenLine xmlns="" xmlns:a14="http://schemas.microsoft.com/office/drawing/2010/main" w="9525">
                   <a:solidFill>
                     <a:srgbClr val="000000"/>
                   </a:solidFill>
@@ -3999,7 +3999,7 @@
             </a:ln>
             <a:extLst>
               <a:ext uri="{91240B29-F687-4f45-9708-019B960494DF}">
-                <a14:hiddenLine xmlns:a14="http://schemas.microsoft.com/office/drawing/2010/main" xmlns="" w="9525">
+                <a14:hiddenLine xmlns="" xmlns:a14="http://schemas.microsoft.com/office/drawing/2010/main" w="9525">
                   <a:solidFill>
                     <a:srgbClr val="000000"/>
                   </a:solidFill>
@@ -4119,7 +4119,7 @@
             </a:ln>
             <a:extLst>
               <a:ext uri="{91240B29-F687-4f45-9708-019B960494DF}">
-                <a14:hiddenLine xmlns:a14="http://schemas.microsoft.com/office/drawing/2010/main" xmlns="" w="9525">
+                <a14:hiddenLine xmlns="" xmlns:a14="http://schemas.microsoft.com/office/drawing/2010/main" w="9525">
                   <a:solidFill>
                     <a:srgbClr val="000000"/>
                   </a:solidFill>
@@ -4187,7 +4187,7 @@
             </a:ln>
             <a:extLst>
               <a:ext uri="{91240B29-F687-4f45-9708-019B960494DF}">
-                <a14:hiddenLine xmlns:a14="http://schemas.microsoft.com/office/drawing/2010/main" xmlns="" w="9525">
+                <a14:hiddenLine xmlns="" xmlns:a14="http://schemas.microsoft.com/office/drawing/2010/main" w="9525">
                   <a:solidFill>
                     <a:srgbClr val="000000"/>
                   </a:solidFill>
@@ -4277,7 +4277,7 @@
             </a:ln>
             <a:extLst>
               <a:ext uri="{91240B29-F687-4f45-9708-019B960494DF}">
-                <a14:hiddenLine xmlns:a14="http://schemas.microsoft.com/office/drawing/2010/main" xmlns="" w="9525">
+                <a14:hiddenLine xmlns="" xmlns:a14="http://schemas.microsoft.com/office/drawing/2010/main" w="9525">
                   <a:solidFill>
                     <a:srgbClr val="000000"/>
                   </a:solidFill>
@@ -8999,7 +8999,7 @@
           <a:noFill/>
           <a:extLst>
             <a:ext uri="{909E8E84-426E-40dd-AFC4-6F175D3DCCD1}">
-              <a14:hiddenFill xmlns:a14="http://schemas.microsoft.com/office/drawing/2010/main" xmlns="">
+              <a14:hiddenFill xmlns="" xmlns:a14="http://schemas.microsoft.com/office/drawing/2010/main">
                 <a:solidFill>
                   <a:srgbClr val="FFFFFF"/>
                 </a:solidFill>
@@ -9073,7 +9073,7 @@
               </a:ln>
               <a:extLst>
                 <a:ext uri="{91240B29-F687-4f45-9708-019B960494DF}">
-                  <a14:hiddenLine xmlns:a14="http://schemas.microsoft.com/office/drawing/2010/main" xmlns="" w="9525">
+                  <a14:hiddenLine xmlns="" xmlns:a14="http://schemas.microsoft.com/office/drawing/2010/main" w="9525">
                     <a:solidFill>
                       <a:srgbClr val="000000"/>
                     </a:solidFill>
@@ -9163,7 +9163,7 @@
               </a:ln>
               <a:extLst>
                 <a:ext uri="{91240B29-F687-4f45-9708-019B960494DF}">
-                  <a14:hiddenLine xmlns:a14="http://schemas.microsoft.com/office/drawing/2010/main" xmlns="" w="9525">
+                  <a14:hiddenLine xmlns="" xmlns:a14="http://schemas.microsoft.com/office/drawing/2010/main" w="9525">
                     <a:solidFill>
                       <a:srgbClr val="000000"/>
                     </a:solidFill>
@@ -9253,7 +9253,7 @@
               </a:ln>
               <a:extLst>
                 <a:ext uri="{91240B29-F687-4f45-9708-019B960494DF}">
-                  <a14:hiddenLine xmlns:a14="http://schemas.microsoft.com/office/drawing/2010/main" xmlns="" w="9525">
+                  <a14:hiddenLine xmlns="" xmlns:a14="http://schemas.microsoft.com/office/drawing/2010/main" w="9525">
                     <a:solidFill>
                       <a:srgbClr val="000000"/>
                     </a:solidFill>
@@ -9315,7 +9315,7 @@
               </a:ln>
               <a:extLst>
                 <a:ext uri="{91240B29-F687-4f45-9708-019B960494DF}">
-                  <a14:hiddenLine xmlns:a14="http://schemas.microsoft.com/office/drawing/2010/main" xmlns="" w="9525">
+                  <a14:hiddenLine xmlns="" xmlns:a14="http://schemas.microsoft.com/office/drawing/2010/main" w="9525">
                     <a:solidFill>
                       <a:srgbClr val="000000"/>
                     </a:solidFill>
@@ -9405,7 +9405,7 @@
               </a:ln>
               <a:extLst>
                 <a:ext uri="{91240B29-F687-4f45-9708-019B960494DF}">
-                  <a14:hiddenLine xmlns:a14="http://schemas.microsoft.com/office/drawing/2010/main" xmlns="" w="9525">
+                  <a14:hiddenLine xmlns="" xmlns:a14="http://schemas.microsoft.com/office/drawing/2010/main" w="9525">
                     <a:solidFill>
                       <a:srgbClr val="000000"/>
                     </a:solidFill>
@@ -9467,7 +9467,7 @@
               </a:ln>
               <a:extLst>
                 <a:ext uri="{91240B29-F687-4f45-9708-019B960494DF}">
-                  <a14:hiddenLine xmlns:a14="http://schemas.microsoft.com/office/drawing/2010/main" xmlns="" w="9525">
+                  <a14:hiddenLine xmlns="" xmlns:a14="http://schemas.microsoft.com/office/drawing/2010/main" w="9525">
                     <a:solidFill>
                       <a:srgbClr val="000000"/>
                     </a:solidFill>
@@ -9529,7 +9529,7 @@
               </a:ln>
               <a:extLst>
                 <a:ext uri="{91240B29-F687-4f45-9708-019B960494DF}">
-                  <a14:hiddenLine xmlns:a14="http://schemas.microsoft.com/office/drawing/2010/main" xmlns="" w="9525">
+                  <a14:hiddenLine xmlns="" xmlns:a14="http://schemas.microsoft.com/office/drawing/2010/main" w="9525">
                     <a:solidFill>
                       <a:srgbClr val="000000"/>
                     </a:solidFill>
@@ -9619,7 +9619,7 @@
               </a:ln>
               <a:extLst>
                 <a:ext uri="{91240B29-F687-4f45-9708-019B960494DF}">
-                  <a14:hiddenLine xmlns:a14="http://schemas.microsoft.com/office/drawing/2010/main" xmlns="" w="9525">
+                  <a14:hiddenLine xmlns="" xmlns:a14="http://schemas.microsoft.com/office/drawing/2010/main" w="9525">
                     <a:solidFill>
                       <a:srgbClr val="000000"/>
                     </a:solidFill>
@@ -9709,7 +9709,7 @@
               </a:ln>
               <a:extLst>
                 <a:ext uri="{91240B29-F687-4f45-9708-019B960494DF}">
-                  <a14:hiddenLine xmlns:a14="http://schemas.microsoft.com/office/drawing/2010/main" xmlns="" w="9525">
+                  <a14:hiddenLine xmlns="" xmlns:a14="http://schemas.microsoft.com/office/drawing/2010/main" w="9525">
                     <a:solidFill>
                       <a:srgbClr val="000000"/>
                     </a:solidFill>
@@ -9771,7 +9771,7 @@
               </a:ln>
               <a:extLst>
                 <a:ext uri="{91240B29-F687-4f45-9708-019B960494DF}">
-                  <a14:hiddenLine xmlns:a14="http://schemas.microsoft.com/office/drawing/2010/main" xmlns="" w="9525">
+                  <a14:hiddenLine xmlns="" xmlns:a14="http://schemas.microsoft.com/office/drawing/2010/main" w="9525">
                     <a:solidFill>
                       <a:srgbClr val="000000"/>
                     </a:solidFill>
@@ -9881,7 +9881,7 @@
               </a:ln>
               <a:extLst>
                 <a:ext uri="{91240B29-F687-4f45-9708-019B960494DF}">
-                  <a14:hiddenLine xmlns:a14="http://schemas.microsoft.com/office/drawing/2010/main" xmlns="" w="9525">
+                  <a14:hiddenLine xmlns="" xmlns:a14="http://schemas.microsoft.com/office/drawing/2010/main" w="9525">
                     <a:solidFill>
                       <a:srgbClr val="000000"/>
                     </a:solidFill>
@@ -9965,7 +9965,7 @@
               </a:ln>
               <a:extLst>
                 <a:ext uri="{91240B29-F687-4f45-9708-019B960494DF}">
-                  <a14:hiddenLine xmlns:a14="http://schemas.microsoft.com/office/drawing/2010/main" xmlns="" w="9525">
+                  <a14:hiddenLine xmlns="" xmlns:a14="http://schemas.microsoft.com/office/drawing/2010/main" w="9525">
                     <a:solidFill>
                       <a:srgbClr val="000000"/>
                     </a:solidFill>
@@ -10027,7 +10027,7 @@
               </a:ln>
               <a:extLst>
                 <a:ext uri="{91240B29-F687-4f45-9708-019B960494DF}">
-                  <a14:hiddenLine xmlns:a14="http://schemas.microsoft.com/office/drawing/2010/main" xmlns="" w="9525">
+                  <a14:hiddenLine xmlns="" xmlns:a14="http://schemas.microsoft.com/office/drawing/2010/main" w="9525">
                     <a:solidFill>
                       <a:srgbClr val="000000"/>
                     </a:solidFill>
@@ -10089,7 +10089,7 @@
               </a:ln>
               <a:extLst>
                 <a:ext uri="{91240B29-F687-4f45-9708-019B960494DF}">
-                  <a14:hiddenLine xmlns:a14="http://schemas.microsoft.com/office/drawing/2010/main" xmlns="" w="9525">
+                  <a14:hiddenLine xmlns="" xmlns:a14="http://schemas.microsoft.com/office/drawing/2010/main" w="9525">
                     <a:solidFill>
                       <a:srgbClr val="000000"/>
                     </a:solidFill>
@@ -10179,7 +10179,7 @@
               </a:ln>
               <a:extLst>
                 <a:ext uri="{91240B29-F687-4f45-9708-019B960494DF}">
-                  <a14:hiddenLine xmlns:a14="http://schemas.microsoft.com/office/drawing/2010/main" xmlns="" w="9525">
+                  <a14:hiddenLine xmlns="" xmlns:a14="http://schemas.microsoft.com/office/drawing/2010/main" w="9525">
                     <a:solidFill>
                       <a:srgbClr val="000000"/>
                     </a:solidFill>
@@ -10213,7 +10213,7 @@
               </a:ln>
               <a:extLst>
                 <a:ext uri="{91240B29-F687-4f45-9708-019B960494DF}">
-                  <a14:hiddenLine xmlns:a14="http://schemas.microsoft.com/office/drawing/2010/main" xmlns="" w="9525">
+                  <a14:hiddenLine xmlns="" xmlns:a14="http://schemas.microsoft.com/office/drawing/2010/main" w="9525">
                     <a:solidFill>
                       <a:srgbClr val="000000"/>
                     </a:solidFill>
@@ -10278,7 +10278,7 @@
               </a:ln>
               <a:extLst>
                 <a:ext uri="{91240B29-F687-4f45-9708-019B960494DF}">
-                  <a14:hiddenLine xmlns:a14="http://schemas.microsoft.com/office/drawing/2010/main" xmlns="" w="9525">
+                  <a14:hiddenLine xmlns="" xmlns:a14="http://schemas.microsoft.com/office/drawing/2010/main" w="9525">
                     <a:solidFill>
                       <a:srgbClr val="000000"/>
                     </a:solidFill>
@@ -10368,7 +10368,7 @@
               </a:ln>
               <a:extLst>
                 <a:ext uri="{91240B29-F687-4f45-9708-019B960494DF}">
-                  <a14:hiddenLine xmlns:a14="http://schemas.microsoft.com/office/drawing/2010/main" xmlns="" w="9525">
+                  <a14:hiddenLine xmlns="" xmlns:a14="http://schemas.microsoft.com/office/drawing/2010/main" w="9525">
                     <a:solidFill>
                       <a:srgbClr val="000000"/>
                     </a:solidFill>
@@ -10430,7 +10430,7 @@
               </a:ln>
               <a:extLst>
                 <a:ext uri="{91240B29-F687-4f45-9708-019B960494DF}">
-                  <a14:hiddenLine xmlns:a14="http://schemas.microsoft.com/office/drawing/2010/main" xmlns="" w="9525">
+                  <a14:hiddenLine xmlns="" xmlns:a14="http://schemas.microsoft.com/office/drawing/2010/main" w="9525">
                     <a:solidFill>
                       <a:srgbClr val="000000"/>
                     </a:solidFill>
@@ -10520,7 +10520,7 @@
               </a:ln>
               <a:extLst>
                 <a:ext uri="{91240B29-F687-4f45-9708-019B960494DF}">
-                  <a14:hiddenLine xmlns:a14="http://schemas.microsoft.com/office/drawing/2010/main" xmlns="" w="9525">
+                  <a14:hiddenLine xmlns="" xmlns:a14="http://schemas.microsoft.com/office/drawing/2010/main" w="9525">
                     <a:solidFill>
                       <a:srgbClr val="000000"/>
                     </a:solidFill>
@@ -10585,7 +10585,7 @@
               </a:ln>
               <a:extLst>
                 <a:ext uri="{91240B29-F687-4f45-9708-019B960494DF}">
-                  <a14:hiddenLine xmlns:a14="http://schemas.microsoft.com/office/drawing/2010/main" xmlns="" w="9525">
+                  <a14:hiddenLine xmlns="" xmlns:a14="http://schemas.microsoft.com/office/drawing/2010/main" w="9525">
                     <a:solidFill>
                       <a:srgbClr val="000000"/>
                     </a:solidFill>
@@ -10647,7 +10647,7 @@
               </a:ln>
               <a:extLst>
                 <a:ext uri="{91240B29-F687-4f45-9708-019B960494DF}">
-                  <a14:hiddenLine xmlns:a14="http://schemas.microsoft.com/office/drawing/2010/main" xmlns="" w="9525">
+                  <a14:hiddenLine xmlns="" xmlns:a14="http://schemas.microsoft.com/office/drawing/2010/main" w="9525">
                     <a:solidFill>
                       <a:srgbClr val="000000"/>
                     </a:solidFill>
@@ -10737,7 +10737,7 @@
               </a:ln>
               <a:extLst>
                 <a:ext uri="{91240B29-F687-4f45-9708-019B960494DF}">
-                  <a14:hiddenLine xmlns:a14="http://schemas.microsoft.com/office/drawing/2010/main" xmlns="" w="9525">
+                  <a14:hiddenLine xmlns="" xmlns:a14="http://schemas.microsoft.com/office/drawing/2010/main" w="9525">
                     <a:solidFill>
                       <a:srgbClr val="000000"/>
                     </a:solidFill>
@@ -10827,7 +10827,7 @@
               </a:ln>
               <a:extLst>
                 <a:ext uri="{91240B29-F687-4f45-9708-019B960494DF}">
-                  <a14:hiddenLine xmlns:a14="http://schemas.microsoft.com/office/drawing/2010/main" xmlns="" w="9525">
+                  <a14:hiddenLine xmlns="" xmlns:a14="http://schemas.microsoft.com/office/drawing/2010/main" w="9525">
                     <a:solidFill>
                       <a:srgbClr val="000000"/>
                     </a:solidFill>
@@ -10892,7 +10892,7 @@
               </a:ln>
               <a:extLst>
                 <a:ext uri="{91240B29-F687-4f45-9708-019B960494DF}">
-                  <a14:hiddenLine xmlns:a14="http://schemas.microsoft.com/office/drawing/2010/main" xmlns="" w="9525">
+                  <a14:hiddenLine xmlns="" xmlns:a14="http://schemas.microsoft.com/office/drawing/2010/main" w="9525">
                     <a:solidFill>
                       <a:srgbClr val="000000"/>
                     </a:solidFill>
@@ -11012,7 +11012,7 @@
               </a:ln>
               <a:extLst>
                 <a:ext uri="{91240B29-F687-4f45-9708-019B960494DF}">
-                  <a14:hiddenLine xmlns:a14="http://schemas.microsoft.com/office/drawing/2010/main" xmlns="" w="9525">
+                  <a14:hiddenLine xmlns="" xmlns:a14="http://schemas.microsoft.com/office/drawing/2010/main" w="9525">
                     <a:solidFill>
                       <a:srgbClr val="000000"/>
                     </a:solidFill>
@@ -11110,7 +11110,7 @@
               </a:ln>
               <a:extLst>
                 <a:ext uri="{91240B29-F687-4f45-9708-019B960494DF}">
-                  <a14:hiddenLine xmlns:a14="http://schemas.microsoft.com/office/drawing/2010/main" xmlns="" w="9525">
+                  <a14:hiddenLine xmlns="" xmlns:a14="http://schemas.microsoft.com/office/drawing/2010/main" w="9525">
                     <a:solidFill>
                       <a:srgbClr val="000000"/>
                     </a:solidFill>
@@ -11225,7 +11225,7 @@
               </a:ln>
               <a:extLst>
                 <a:ext uri="{91240B29-F687-4f45-9708-019B960494DF}">
-                  <a14:hiddenLine xmlns:a14="http://schemas.microsoft.com/office/drawing/2010/main" xmlns="" w="9525">
+                  <a14:hiddenLine xmlns="" xmlns:a14="http://schemas.microsoft.com/office/drawing/2010/main" w="9525">
                     <a:solidFill>
                       <a:srgbClr val="000000"/>
                     </a:solidFill>
@@ -11315,7 +11315,7 @@
               </a:ln>
               <a:extLst>
                 <a:ext uri="{91240B29-F687-4f45-9708-019B960494DF}">
-                  <a14:hiddenLine xmlns:a14="http://schemas.microsoft.com/office/drawing/2010/main" xmlns="" w="9525">
+                  <a14:hiddenLine xmlns="" xmlns:a14="http://schemas.microsoft.com/office/drawing/2010/main" w="9525">
                     <a:solidFill>
                       <a:srgbClr val="000000"/>
                     </a:solidFill>
@@ -11380,7 +11380,7 @@
               </a:ln>
               <a:extLst>
                 <a:ext uri="{91240B29-F687-4f45-9708-019B960494DF}">
-                  <a14:hiddenLine xmlns:a14="http://schemas.microsoft.com/office/drawing/2010/main" xmlns="" w="9525">
+                  <a14:hiddenLine xmlns="" xmlns:a14="http://schemas.microsoft.com/office/drawing/2010/main" w="9525">
                     <a:solidFill>
                       <a:srgbClr val="000000"/>
                     </a:solidFill>
@@ -11470,7 +11470,7 @@
               </a:ln>
               <a:extLst>
                 <a:ext uri="{91240B29-F687-4f45-9708-019B960494DF}">
-                  <a14:hiddenLine xmlns:a14="http://schemas.microsoft.com/office/drawing/2010/main" xmlns="" w="9525">
+                  <a14:hiddenLine xmlns="" xmlns:a14="http://schemas.microsoft.com/office/drawing/2010/main" w="9525">
                     <a:solidFill>
                       <a:srgbClr val="000000"/>
                     </a:solidFill>
@@ -11538,7 +11538,7 @@
               </a:ln>
               <a:extLst>
                 <a:ext uri="{91240B29-F687-4f45-9708-019B960494DF}">
-                  <a14:hiddenLine xmlns:a14="http://schemas.microsoft.com/office/drawing/2010/main" xmlns="" w="9525">
+                  <a14:hiddenLine xmlns="" xmlns:a14="http://schemas.microsoft.com/office/drawing/2010/main" w="9525">
                     <a:solidFill>
                       <a:srgbClr val="000000"/>
                     </a:solidFill>
@@ -11628,7 +11628,7 @@
               </a:ln>
               <a:extLst>
                 <a:ext uri="{91240B29-F687-4f45-9708-019B960494DF}">
-                  <a14:hiddenLine xmlns:a14="http://schemas.microsoft.com/office/drawing/2010/main" xmlns="" w="9525">
+                  <a14:hiddenLine xmlns="" xmlns:a14="http://schemas.microsoft.com/office/drawing/2010/main" w="9525">
                     <a:solidFill>
                       <a:srgbClr val="000000"/>
                     </a:solidFill>
@@ -11696,7 +11696,7 @@
               </a:ln>
               <a:extLst>
                 <a:ext uri="{91240B29-F687-4f45-9708-019B960494DF}">
-                  <a14:hiddenLine xmlns:a14="http://schemas.microsoft.com/office/drawing/2010/main" xmlns="" w="9525">
+                  <a14:hiddenLine xmlns="" xmlns:a14="http://schemas.microsoft.com/office/drawing/2010/main" w="9525">
                     <a:solidFill>
                       <a:srgbClr val="000000"/>
                     </a:solidFill>
@@ -11786,7 +11786,7 @@
               </a:ln>
               <a:extLst>
                 <a:ext uri="{91240B29-F687-4f45-9708-019B960494DF}">
-                  <a14:hiddenLine xmlns:a14="http://schemas.microsoft.com/office/drawing/2010/main" xmlns="" w="9525">
+                  <a14:hiddenLine xmlns="" xmlns:a14="http://schemas.microsoft.com/office/drawing/2010/main" w="9525">
                     <a:solidFill>
                       <a:srgbClr val="000000"/>
                     </a:solidFill>
@@ -11820,7 +11820,7 @@
               </a:ln>
               <a:extLst>
                 <a:ext uri="{91240B29-F687-4f45-9708-019B960494DF}">
-                  <a14:hiddenLine xmlns:a14="http://schemas.microsoft.com/office/drawing/2010/main" xmlns="" w="9525">
+                  <a14:hiddenLine xmlns="" xmlns:a14="http://schemas.microsoft.com/office/drawing/2010/main" w="9525">
                     <a:solidFill>
                       <a:srgbClr val="000000"/>
                     </a:solidFill>
@@ -15308,8 +15308,8 @@
         </p:nvSpPr>
         <p:spPr>
           <a:xfrm>
-            <a:off x="8572500" y="992604"/>
-            <a:ext cx="2451100" cy="4100096"/>
+            <a:off x="8833756" y="1057918"/>
+            <a:ext cx="3069771" cy="4100096"/>
           </a:xfrm>
         </p:spPr>
         <p:txBody>
@@ -15363,10 +15363,10 @@
       </p:sp>
       <p:pic>
         <p:nvPicPr>
-          <p:cNvPr id="7" name="Picture 6">
+          <p:cNvPr id="4" name="Picture 3">
             <a:extLst>
               <a:ext uri="{FF2B5EF4-FFF2-40B4-BE49-F238E27FC236}">
-                <a16:creationId xmlns:a16="http://schemas.microsoft.com/office/drawing/2014/main" id="{A5801730-EBE5-1E40-9C27-E2E940087AB7}"/>
+                <a16:creationId xmlns:a16="http://schemas.microsoft.com/office/drawing/2014/main" id="{BE864591-EAF0-FC42-A19A-D8E6E013C781}"/>
               </a:ext>
             </a:extLst>
           </p:cNvPr>
@@ -15375,15 +15375,16 @@
           </p:cNvPicPr>
           <p:nvPr/>
         </p:nvPicPr>
-        <p:blipFill rotWithShape="1">
+        <p:blipFill>
           <a:blip r:embed="rId2"/>
-          <a:srcRect l="4074" t="5740" r="3333" b="5556"/>
-          <a:stretch/>
+          <a:stretch>
+            <a:fillRect/>
+          </a:stretch>
         </p:blipFill>
         <p:spPr>
           <a:xfrm>
-            <a:off x="1346200" y="182549"/>
-            <a:ext cx="6756400" cy="6472632"/>
+            <a:off x="1012371" y="-388258"/>
+            <a:ext cx="7634515" cy="7634515"/>
           </a:xfrm>
           <a:prstGeom prst="rect">
             <a:avLst/>
@@ -15792,13 +15793,13 @@
         </p:nvPicPr>
         <p:blipFill rotWithShape="1">
           <a:blip r:embed="rId2"/>
-          <a:srcRect l="22868" t="30925" r="19043" b="35740"/>
+          <a:srcRect l="24724" t="33179" r="18476" b="35740"/>
           <a:stretch/>
         </p:blipFill>
         <p:spPr>
           <a:xfrm>
-            <a:off x="1079500" y="1291161"/>
-            <a:ext cx="9652000" cy="5446270"/>
+            <a:off x="1076896" y="1306283"/>
+            <a:ext cx="9912237" cy="5333174"/>
           </a:xfrm>
           <a:prstGeom prst="rect">
             <a:avLst/>

</xml_diff>